<commit_message>
Updated communication graphic to include lab manager
</commit_message>
<xml_diff>
--- a/img/Lab communication structure.pptx
+++ b/img/Lab communication structure.pptx
@@ -104,6 +104,11 @@
       </a:defRPr>
     </a:lvl9pPr>
   </p:defaultTextStyle>
+  <p:extLst>
+    <p:ext uri="{EFAFB233-063F-42B5-8137-9DF3F51BA10A}">
+      <p15:sldGuideLst xmlns:p15="http://schemas.microsoft.com/office/powerpoint/2012/main"/>
+    </p:ext>
+  </p:extLst>
 </p:presentation>
 </file>
 
@@ -256,7 +261,7 @@
           <a:p>
             <a:fld id="{368C13EB-A3E5-479E-A8FC-7F7B4F66C038}" type="datetimeFigureOut">
               <a:rPr lang="en-CA" smtClean="0"/>
-              <a:t>2023-03-07</a:t>
+              <a:t>2023-04-17</a:t>
             </a:fld>
             <a:endParaRPr lang="en-CA"/>
           </a:p>
@@ -456,7 +461,7 @@
           <a:p>
             <a:fld id="{368C13EB-A3E5-479E-A8FC-7F7B4F66C038}" type="datetimeFigureOut">
               <a:rPr lang="en-CA" smtClean="0"/>
-              <a:t>2023-03-07</a:t>
+              <a:t>2023-04-17</a:t>
             </a:fld>
             <a:endParaRPr lang="en-CA"/>
           </a:p>
@@ -666,7 +671,7 @@
           <a:p>
             <a:fld id="{368C13EB-A3E5-479E-A8FC-7F7B4F66C038}" type="datetimeFigureOut">
               <a:rPr lang="en-CA" smtClean="0"/>
-              <a:t>2023-03-07</a:t>
+              <a:t>2023-04-17</a:t>
             </a:fld>
             <a:endParaRPr lang="en-CA"/>
           </a:p>
@@ -866,7 +871,7 @@
           <a:p>
             <a:fld id="{368C13EB-A3E5-479E-A8FC-7F7B4F66C038}" type="datetimeFigureOut">
               <a:rPr lang="en-CA" smtClean="0"/>
-              <a:t>2023-03-07</a:t>
+              <a:t>2023-04-17</a:t>
             </a:fld>
             <a:endParaRPr lang="en-CA"/>
           </a:p>
@@ -1142,7 +1147,7 @@
           <a:p>
             <a:fld id="{368C13EB-A3E5-479E-A8FC-7F7B4F66C038}" type="datetimeFigureOut">
               <a:rPr lang="en-CA" smtClean="0"/>
-              <a:t>2023-03-07</a:t>
+              <a:t>2023-04-17</a:t>
             </a:fld>
             <a:endParaRPr lang="en-CA"/>
           </a:p>
@@ -1410,7 +1415,7 @@
           <a:p>
             <a:fld id="{368C13EB-A3E5-479E-A8FC-7F7B4F66C038}" type="datetimeFigureOut">
               <a:rPr lang="en-CA" smtClean="0"/>
-              <a:t>2023-03-07</a:t>
+              <a:t>2023-04-17</a:t>
             </a:fld>
             <a:endParaRPr lang="en-CA"/>
           </a:p>
@@ -1825,7 +1830,7 @@
           <a:p>
             <a:fld id="{368C13EB-A3E5-479E-A8FC-7F7B4F66C038}" type="datetimeFigureOut">
               <a:rPr lang="en-CA" smtClean="0"/>
-              <a:t>2023-03-07</a:t>
+              <a:t>2023-04-17</a:t>
             </a:fld>
             <a:endParaRPr lang="en-CA"/>
           </a:p>
@@ -1967,7 +1972,7 @@
           <a:p>
             <a:fld id="{368C13EB-A3E5-479E-A8FC-7F7B4F66C038}" type="datetimeFigureOut">
               <a:rPr lang="en-CA" smtClean="0"/>
-              <a:t>2023-03-07</a:t>
+              <a:t>2023-04-17</a:t>
             </a:fld>
             <a:endParaRPr lang="en-CA"/>
           </a:p>
@@ -2080,7 +2085,7 @@
           <a:p>
             <a:fld id="{368C13EB-A3E5-479E-A8FC-7F7B4F66C038}" type="datetimeFigureOut">
               <a:rPr lang="en-CA" smtClean="0"/>
-              <a:t>2023-03-07</a:t>
+              <a:t>2023-04-17</a:t>
             </a:fld>
             <a:endParaRPr lang="en-CA"/>
           </a:p>
@@ -2393,7 +2398,7 @@
           <a:p>
             <a:fld id="{368C13EB-A3E5-479E-A8FC-7F7B4F66C038}" type="datetimeFigureOut">
               <a:rPr lang="en-CA" smtClean="0"/>
-              <a:t>2023-03-07</a:t>
+              <a:t>2023-04-17</a:t>
             </a:fld>
             <a:endParaRPr lang="en-CA"/>
           </a:p>
@@ -2682,7 +2687,7 @@
           <a:p>
             <a:fld id="{368C13EB-A3E5-479E-A8FC-7F7B4F66C038}" type="datetimeFigureOut">
               <a:rPr lang="en-CA" smtClean="0"/>
-              <a:t>2023-03-07</a:t>
+              <a:t>2023-04-17</a:t>
             </a:fld>
             <a:endParaRPr lang="en-CA"/>
           </a:p>
@@ -2925,7 +2930,7 @@
           <a:p>
             <a:fld id="{368C13EB-A3E5-479E-A8FC-7F7B4F66C038}" type="datetimeFigureOut">
               <a:rPr lang="en-CA" smtClean="0"/>
-              <a:t>2023-03-07</a:t>
+              <a:t>2023-04-17</a:t>
             </a:fld>
             <a:endParaRPr lang="en-CA"/>
           </a:p>
@@ -4022,6 +4027,255 @@
           </a:xfrm>
           <a:prstGeom prst="straightConnector1">
             <a:avLst/>
+          </a:prstGeom>
+          <a:ln w="38100">
+            <a:solidFill>
+              <a:schemeClr val="tx1"/>
+            </a:solidFill>
+            <a:headEnd type="triangle"/>
+            <a:tailEnd type="triangle"/>
+          </a:ln>
+        </p:spPr>
+        <p:style>
+          <a:lnRef idx="1">
+            <a:schemeClr val="accent1"/>
+          </a:lnRef>
+          <a:fillRef idx="0">
+            <a:schemeClr val="accent1"/>
+          </a:fillRef>
+          <a:effectRef idx="0">
+            <a:schemeClr val="accent1"/>
+          </a:effectRef>
+          <a:fontRef idx="minor">
+            <a:schemeClr val="tx1"/>
+          </a:fontRef>
+        </p:style>
+      </p:cxnSp>
+      <p:sp>
+        <p:nvSpPr>
+          <p:cNvPr id="2" name="TextBox 1">
+            <a:extLst>
+              <a:ext uri="{FF2B5EF4-FFF2-40B4-BE49-F238E27FC236}">
+                <a16:creationId xmlns:a16="http://schemas.microsoft.com/office/drawing/2014/main" id="{E7F8EE59-7274-463C-8814-40B92BDE0F00}"/>
+              </a:ext>
+            </a:extLst>
+          </p:cNvPr>
+          <p:cNvSpPr txBox="1"/>
+          <p:nvPr/>
+        </p:nvSpPr>
+        <p:spPr>
+          <a:xfrm>
+            <a:off x="8020729" y="381738"/>
+            <a:ext cx="1482571" cy="646331"/>
+          </a:xfrm>
+          <a:prstGeom prst="rect">
+            <a:avLst/>
+          </a:prstGeom>
+          <a:noFill/>
+          <a:ln w="38100">
+            <a:solidFill>
+              <a:srgbClr val="00B050"/>
+            </a:solidFill>
+          </a:ln>
+        </p:spPr>
+        <p:txBody>
+          <a:bodyPr wrap="square" rtlCol="0">
+            <a:spAutoFit/>
+          </a:bodyPr>
+          <a:lstStyle/>
+          <a:p>
+            <a:pPr algn="ctr"/>
+            <a:r>
+              <a:rPr lang="en-CA" dirty="0">
+                <a:solidFill>
+                  <a:srgbClr val="002060"/>
+                </a:solidFill>
+              </a:rPr>
+              <a:t>Lab </a:t>
+            </a:r>
+          </a:p>
+          <a:p>
+            <a:pPr algn="ctr"/>
+            <a:r>
+              <a:rPr lang="en-CA" dirty="0">
+                <a:solidFill>
+                  <a:srgbClr val="002060"/>
+                </a:solidFill>
+              </a:rPr>
+              <a:t>Manager</a:t>
+            </a:r>
+          </a:p>
+        </p:txBody>
+      </p:sp>
+      <p:cxnSp>
+        <p:nvCxnSpPr>
+          <p:cNvPr id="3" name="Straight Arrow Connector 2">
+            <a:extLst>
+              <a:ext uri="{FF2B5EF4-FFF2-40B4-BE49-F238E27FC236}">
+                <a16:creationId xmlns:a16="http://schemas.microsoft.com/office/drawing/2014/main" id="{ACB13E18-19F5-1F66-688E-FAB559AA7497}"/>
+              </a:ext>
+            </a:extLst>
+          </p:cNvPr>
+          <p:cNvCxnSpPr>
+            <a:cxnSpLocks/>
+            <a:stCxn id="6" idx="3"/>
+            <a:endCxn id="2" idx="1"/>
+          </p:cNvCxnSpPr>
+          <p:nvPr/>
+        </p:nvCxnSpPr>
+        <p:spPr>
+          <a:xfrm flipV="1">
+            <a:off x="6837285" y="704904"/>
+            <a:ext cx="1183444" cy="1"/>
+          </a:xfrm>
+          <a:prstGeom prst="straightConnector1">
+            <a:avLst/>
+          </a:prstGeom>
+          <a:ln w="38100">
+            <a:solidFill>
+              <a:schemeClr val="tx1"/>
+            </a:solidFill>
+            <a:headEnd type="triangle"/>
+            <a:tailEnd type="triangle"/>
+          </a:ln>
+        </p:spPr>
+        <p:style>
+          <a:lnRef idx="1">
+            <a:schemeClr val="accent1"/>
+          </a:lnRef>
+          <a:fillRef idx="0">
+            <a:schemeClr val="accent1"/>
+          </a:fillRef>
+          <a:effectRef idx="0">
+            <a:schemeClr val="accent1"/>
+          </a:effectRef>
+          <a:fontRef idx="minor">
+            <a:schemeClr val="tx1"/>
+          </a:fontRef>
+        </p:style>
+      </p:cxnSp>
+      <p:cxnSp>
+        <p:nvCxnSpPr>
+          <p:cNvPr id="7" name="Straight Arrow Connector 6">
+            <a:extLst>
+              <a:ext uri="{FF2B5EF4-FFF2-40B4-BE49-F238E27FC236}">
+                <a16:creationId xmlns:a16="http://schemas.microsoft.com/office/drawing/2014/main" id="{B2D6D438-6DE3-93A8-E584-1B6B305C5551}"/>
+              </a:ext>
+            </a:extLst>
+          </p:cNvPr>
+          <p:cNvCxnSpPr>
+            <a:cxnSpLocks/>
+            <a:stCxn id="2" idx="2"/>
+            <a:endCxn id="10" idx="0"/>
+          </p:cNvCxnSpPr>
+          <p:nvPr/>
+        </p:nvCxnSpPr>
+        <p:spPr>
+          <a:xfrm>
+            <a:off x="8762015" y="1028069"/>
+            <a:ext cx="4686" cy="1272727"/>
+          </a:xfrm>
+          <a:prstGeom prst="straightConnector1">
+            <a:avLst/>
+          </a:prstGeom>
+          <a:ln w="38100">
+            <a:solidFill>
+              <a:schemeClr val="tx1"/>
+            </a:solidFill>
+            <a:headEnd type="triangle"/>
+            <a:tailEnd type="triangle"/>
+          </a:ln>
+        </p:spPr>
+        <p:style>
+          <a:lnRef idx="1">
+            <a:schemeClr val="accent1"/>
+          </a:lnRef>
+          <a:fillRef idx="0">
+            <a:schemeClr val="accent1"/>
+          </a:fillRef>
+          <a:effectRef idx="0">
+            <a:schemeClr val="accent1"/>
+          </a:effectRef>
+          <a:fontRef idx="minor">
+            <a:schemeClr val="tx1"/>
+          </a:fontRef>
+        </p:style>
+      </p:cxnSp>
+      <p:cxnSp>
+        <p:nvCxnSpPr>
+          <p:cNvPr id="22" name="Straight Arrow Connector 21">
+            <a:extLst>
+              <a:ext uri="{FF2B5EF4-FFF2-40B4-BE49-F238E27FC236}">
+                <a16:creationId xmlns:a16="http://schemas.microsoft.com/office/drawing/2014/main" id="{08305553-FA44-9DA4-8B95-8118DE82B5CA}"/>
+              </a:ext>
+            </a:extLst>
+          </p:cNvPr>
+          <p:cNvCxnSpPr>
+            <a:cxnSpLocks/>
+            <a:stCxn id="2" idx="3"/>
+            <a:endCxn id="14" idx="3"/>
+          </p:cNvCxnSpPr>
+          <p:nvPr/>
+        </p:nvCxnSpPr>
+        <p:spPr>
+          <a:xfrm>
+            <a:off x="9503300" y="704904"/>
+            <a:ext cx="887769" cy="3529136"/>
+          </a:xfrm>
+          <a:prstGeom prst="curvedConnector3">
+            <a:avLst>
+              <a:gd name="adj1" fmla="val 188750"/>
+            </a:avLst>
+          </a:prstGeom>
+          <a:ln w="38100">
+            <a:solidFill>
+              <a:schemeClr val="tx1"/>
+            </a:solidFill>
+            <a:headEnd type="triangle"/>
+            <a:tailEnd type="triangle"/>
+          </a:ln>
+        </p:spPr>
+        <p:style>
+          <a:lnRef idx="1">
+            <a:schemeClr val="accent1"/>
+          </a:lnRef>
+          <a:fillRef idx="0">
+            <a:schemeClr val="accent1"/>
+          </a:fillRef>
+          <a:effectRef idx="0">
+            <a:schemeClr val="accent1"/>
+          </a:effectRef>
+          <a:fontRef idx="minor">
+            <a:schemeClr val="tx1"/>
+          </a:fontRef>
+        </p:style>
+      </p:cxnSp>
+      <p:cxnSp>
+        <p:nvCxnSpPr>
+          <p:cNvPr id="26" name="Straight Arrow Connector 21">
+            <a:extLst>
+              <a:ext uri="{FF2B5EF4-FFF2-40B4-BE49-F238E27FC236}">
+                <a16:creationId xmlns:a16="http://schemas.microsoft.com/office/drawing/2014/main" id="{CAABCE0C-7760-2833-5866-4386982E063F}"/>
+              </a:ext>
+            </a:extLst>
+          </p:cNvPr>
+          <p:cNvCxnSpPr>
+            <a:cxnSpLocks/>
+            <a:stCxn id="2" idx="3"/>
+            <a:endCxn id="13" idx="2"/>
+          </p:cNvCxnSpPr>
+          <p:nvPr/>
+        </p:nvCxnSpPr>
+        <p:spPr>
+          <a:xfrm flipH="1">
+            <a:off x="7947488" y="704904"/>
+            <a:ext cx="1555812" cy="3852301"/>
+          </a:xfrm>
+          <a:prstGeom prst="curvedConnector4">
+            <a:avLst>
+              <a:gd name="adj1" fmla="val -145934"/>
+              <a:gd name="adj2" fmla="val 113078"/>
+            </a:avLst>
           </a:prstGeom>
           <a:ln w="38100">
             <a:solidFill>

</xml_diff>